<commit_message>
Minor fixes for "19-Recursive-Algo-Backtracking"
</commit_message>
<xml_diff>
--- a/Courses/Software-Sciences/Module-2-DS-and-Algo-New/19-Recursive-Algo-Backtracking/19-Recursive-Algo-Backtracking.pptx
+++ b/Courses/Software-Sciences/Module-2-DS-and-Algo-New/19-Recursive-Algo-Backtracking/19-Recursive-Algo-Backtracking.pptx
@@ -7954,7 +7954,7 @@
           <a:p>
             <a:fld id="{4E087215-0C8F-4762-A664-737A353EC9A4}" type="datetimeFigureOut">
               <a:rPr lang="bg-BG" smtClean="0"/>
-              <a:t>6.4.2023 г.</a:t>
+              <a:t>14.4.2023 г.</a:t>
             </a:fld>
             <a:endParaRPr lang="bg-BG" dirty="0"/>
           </a:p>
@@ -8145,7 +8145,7 @@
           <a:p>
             <a:fld id="{72D84649-876A-46C9-8472-14CB09C070D8}" type="datetimeFigureOut">
               <a:rPr lang="en-US" smtClean="0"/>
-              <a:t>4/6/2023</a:t>
+              <a:t>4/14/2023</a:t>
             </a:fld>
             <a:endParaRPr lang="en-US" dirty="0"/>
           </a:p>
@@ -23470,19 +23470,7 @@
               <a:rPr lang="en-US" sz="1999" dirty="0">
                 <a:hlinkClick r:id="rId3"/>
               </a:rPr>
-              <a:t>https://judge.softuni.bg/Contests/2726/Recursive</a:t>
-            </a:r>
-            <a:r>
-              <a:rPr lang="en-US" sz="1999" dirty="0">
-                <a:hlinkClick r:id="rId3"/>
-              </a:rPr>
-              <a:t>-</a:t>
-            </a:r>
-            <a:r>
-              <a:rPr lang="en-US" sz="1999" dirty="0">
-                <a:hlinkClick r:id="rId3"/>
-              </a:rPr>
-              <a:t>Algorithms</a:t>
+              <a:t>https://judge.softuni.bg/Contests/2726/Recursive-Algorithms</a:t>
             </a:r>
             <a:endParaRPr lang="en-US" sz="1999" dirty="0"/>
           </a:p>
@@ -24365,7 +24353,15 @@
           <a:p>
             <a:r>
               <a:rPr lang="ru-RU" sz="2800" dirty="0"/>
-              <a:t>Генериране на 3-битови вектори: Дърво на рекурсия</a:t>
+              <a:t>Генериране на 3-битови вектори: </a:t>
+            </a:r>
+            <a:r>
+              <a:rPr lang="ru-RU" sz="2800" dirty="0" err="1"/>
+              <a:t>дърво</a:t>
+            </a:r>
+            <a:r>
+              <a:rPr lang="ru-RU" sz="2800" dirty="0"/>
+              <a:t> на рекурсия</a:t>
             </a:r>
             <a:endParaRPr lang="bg-BG" sz="2800" dirty="0"/>
           </a:p>

</xml_diff>